<commit_message>
Edited  pres. and preps for next one
</commit_message>
<xml_diff>
--- a/doc/symposium/04_17/symposium.pptx
+++ b/doc/symposium/04_17/symposium.pptx
@@ -116,6 +116,11 @@
       </a:defRPr>
     </a:lvl9pPr>
   </p:defaultTextStyle>
+  <p:extLst>
+    <p:ext uri="{EFAFB233-063F-42B5-8137-9DF3F51BA10A}">
+      <p15:sldGuideLst xmlns:p15="http://schemas.microsoft.com/office/powerpoint/2012/main"/>
+    </p:ext>
+  </p:extLst>
 </p:presentation>
 </file>
 
@@ -5842,7 +5847,23 @@
           <a:p>
             <a:r>
               <a:rPr lang="en-US" dirty="0"/>
-              <a:t>Semester project</a:t>
+              <a:t> </a:t>
+            </a:r>
+            <a:r>
+              <a:rPr lang="en-US" dirty="0" err="1"/>
+              <a:t>Torner</a:t>
+            </a:r>
+            <a:r>
+              <a:rPr lang="en-US" dirty="0"/>
+              <a:t> </a:t>
+            </a:r>
+            <a:r>
+              <a:rPr lang="en-US" dirty="0" err="1"/>
+              <a:t>Márton</a:t>
+            </a:r>
+            <a:r>
+              <a:rPr lang="en-US" dirty="0"/>
+              <a:t> - Semester project</a:t>
             </a:r>
           </a:p>
           <a:p>
@@ -6237,7 +6258,9 @@
         </p:nvSpPr>
         <p:spPr/>
         <p:txBody>
-          <a:bodyPr/>
+          <a:bodyPr>
+            <a:normAutofit lnSpcReduction="10000"/>
+          </a:bodyPr>
           <a:lstStyle/>
           <a:p>
             <a:r>
@@ -6250,6 +6273,13 @@
             <a:r>
               <a:rPr lang="en-US" dirty="0"/>
               <a:t>The above shown</a:t>
+            </a:r>
+          </a:p>
+          <a:p>
+            <a:pPr lvl="1"/>
+            <a:r>
+              <a:rPr lang="en-US" dirty="0"/>
+              <a:t>WAMP and VWAP calculation</a:t>
             </a:r>
           </a:p>
           <a:p>
@@ -7465,7 +7495,7 @@
           <a:p>
             <a:r>
               <a:rPr lang="en-US" dirty="0"/>
-              <a:t>Before: random</a:t>
+              <a:t>Before: “random”</a:t>
             </a:r>
           </a:p>
           <a:p>

</xml_diff>